<commit_message>
Added more explanation and figures to Cryptocurrency and BitCoin.
</commit_message>
<xml_diff>
--- a/CryptoCurrencyIntroduction/CryptoCurrencyIntroduction.pptx
+++ b/CryptoCurrencyIntroduction/CryptoCurrencyIntroduction.pptx
@@ -8,6 +8,7 @@
     <p:sldId id="256" r:id="rId2"/>
     <p:sldId id="257" r:id="rId3"/>
     <p:sldId id="258" r:id="rId4"/>
+    <p:sldId id="259" r:id="rId5"/>
   </p:sldIdLst>
   <p:sldSz cx="9144000" cy="6858000" type="screen4x3"/>
   <p:notesSz cx="6858000" cy="9144000"/>
@@ -290,7 +291,7 @@
           <a:p>
             <a:fld id="{D15871BB-BFA2-694E-BE18-5A55F9962899}" type="datetimeFigureOut">
               <a:rPr lang="en-US" smtClean="0"/>
-              <a:t>11/2/21</a:t>
+              <a:t>11/6/21</a:t>
             </a:fld>
             <a:endParaRPr lang="en-US"/>
           </a:p>
@@ -460,7 +461,7 @@
           <a:p>
             <a:fld id="{D15871BB-BFA2-694E-BE18-5A55F9962899}" type="datetimeFigureOut">
               <a:rPr lang="en-US" smtClean="0"/>
-              <a:t>11/2/21</a:t>
+              <a:t>11/6/21</a:t>
             </a:fld>
             <a:endParaRPr lang="en-US"/>
           </a:p>
@@ -640,7 +641,7 @@
           <a:p>
             <a:fld id="{D15871BB-BFA2-694E-BE18-5A55F9962899}" type="datetimeFigureOut">
               <a:rPr lang="en-US" smtClean="0"/>
-              <a:t>11/2/21</a:t>
+              <a:t>11/6/21</a:t>
             </a:fld>
             <a:endParaRPr lang="en-US"/>
           </a:p>
@@ -810,7 +811,7 @@
           <a:p>
             <a:fld id="{D15871BB-BFA2-694E-BE18-5A55F9962899}" type="datetimeFigureOut">
               <a:rPr lang="en-US" smtClean="0"/>
-              <a:t>11/2/21</a:t>
+              <a:t>11/6/21</a:t>
             </a:fld>
             <a:endParaRPr lang="en-US"/>
           </a:p>
@@ -1056,7 +1057,7 @@
           <a:p>
             <a:fld id="{D15871BB-BFA2-694E-BE18-5A55F9962899}" type="datetimeFigureOut">
               <a:rPr lang="en-US" smtClean="0"/>
-              <a:t>11/2/21</a:t>
+              <a:t>11/6/21</a:t>
             </a:fld>
             <a:endParaRPr lang="en-US"/>
           </a:p>
@@ -1344,7 +1345,7 @@
           <a:p>
             <a:fld id="{D15871BB-BFA2-694E-BE18-5A55F9962899}" type="datetimeFigureOut">
               <a:rPr lang="en-US" smtClean="0"/>
-              <a:t>11/2/21</a:t>
+              <a:t>11/6/21</a:t>
             </a:fld>
             <a:endParaRPr lang="en-US"/>
           </a:p>
@@ -1766,7 +1767,7 @@
           <a:p>
             <a:fld id="{D15871BB-BFA2-694E-BE18-5A55F9962899}" type="datetimeFigureOut">
               <a:rPr lang="en-US" smtClean="0"/>
-              <a:t>11/2/21</a:t>
+              <a:t>11/6/21</a:t>
             </a:fld>
             <a:endParaRPr lang="en-US"/>
           </a:p>
@@ -1884,7 +1885,7 @@
           <a:p>
             <a:fld id="{D15871BB-BFA2-694E-BE18-5A55F9962899}" type="datetimeFigureOut">
               <a:rPr lang="en-US" smtClean="0"/>
-              <a:t>11/2/21</a:t>
+              <a:t>11/6/21</a:t>
             </a:fld>
             <a:endParaRPr lang="en-US"/>
           </a:p>
@@ -1979,7 +1980,7 @@
           <a:p>
             <a:fld id="{D15871BB-BFA2-694E-BE18-5A55F9962899}" type="datetimeFigureOut">
               <a:rPr lang="en-US" smtClean="0"/>
-              <a:t>11/2/21</a:t>
+              <a:t>11/6/21</a:t>
             </a:fld>
             <a:endParaRPr lang="en-US"/>
           </a:p>
@@ -2256,7 +2257,7 @@
           <a:p>
             <a:fld id="{D15871BB-BFA2-694E-BE18-5A55F9962899}" type="datetimeFigureOut">
               <a:rPr lang="en-US" smtClean="0"/>
-              <a:t>11/2/21</a:t>
+              <a:t>11/6/21</a:t>
             </a:fld>
             <a:endParaRPr lang="en-US"/>
           </a:p>
@@ -2509,7 +2510,7 @@
           <a:p>
             <a:fld id="{D15871BB-BFA2-694E-BE18-5A55F9962899}" type="datetimeFigureOut">
               <a:rPr lang="en-US" smtClean="0"/>
-              <a:t>11/2/21</a:t>
+              <a:t>11/6/21</a:t>
             </a:fld>
             <a:endParaRPr lang="en-US"/>
           </a:p>
@@ -2722,7 +2723,7 @@
           <a:p>
             <a:fld id="{D15871BB-BFA2-694E-BE18-5A55F9962899}" type="datetimeFigureOut">
               <a:rPr lang="en-US" smtClean="0"/>
-              <a:t>11/2/21</a:t>
+              <a:t>11/6/21</a:t>
             </a:fld>
             <a:endParaRPr lang="en-US"/>
           </a:p>
@@ -3387,11 +3388,7 @@
           <a:p>
             <a:r>
               <a:rPr lang="en-US" sz="3200" b="1" dirty="0" smtClean="0"/>
-              <a:t>Tamper-resistant </a:t>
-            </a:r>
-            <a:r>
-              <a:rPr lang="en-US" sz="3200" b="1" dirty="0" smtClean="0"/>
-              <a:t>data</a:t>
+              <a:t>Tamper-resistant data</a:t>
             </a:r>
           </a:p>
           <a:p>
@@ -3487,7 +3484,6 @@
               <a:rPr lang="en-US" sz="3200" b="1" baseline="-25000" dirty="0" smtClean="0"/>
               <a:t>2</a:t>
             </a:r>
-            <a:endParaRPr lang="en-US" sz="3200" b="1" baseline="-25000" dirty="0" smtClean="0"/>
           </a:p>
         </p:txBody>
       </p:sp>
@@ -3855,11 +3851,6 @@
               </a:rPr>
               <a:t>2</a:t>
             </a:r>
-            <a:endParaRPr lang="en-US" sz="6000" baseline="-25000" dirty="0">
-              <a:solidFill>
-                <a:schemeClr val="tx1"/>
-              </a:solidFill>
-            </a:endParaRPr>
           </a:p>
         </p:txBody>
       </p:sp>
@@ -3909,15 +3900,7 @@
                   <a:schemeClr val="tx1"/>
                 </a:solidFill>
               </a:rPr>
-              <a:t>p</a:t>
-            </a:r>
-            <a:r>
-              <a:rPr lang="en-US" sz="3200" dirty="0" smtClean="0">
-                <a:solidFill>
-                  <a:schemeClr val="tx1"/>
-                </a:solidFill>
-              </a:rPr>
-              <a:t>tr</a:t>
+              <a:t>ptr</a:t>
             </a:r>
             <a:r>
               <a:rPr lang="en-US" sz="3200" baseline="-25000" dirty="0" smtClean="0">
@@ -4155,15 +4138,7 @@
                   <a:schemeClr val="tx1"/>
                 </a:solidFill>
               </a:rPr>
-              <a:t>p</a:t>
-            </a:r>
-            <a:r>
-              <a:rPr lang="en-US" sz="3200" dirty="0" smtClean="0">
-                <a:solidFill>
-                  <a:schemeClr val="tx1"/>
-                </a:solidFill>
-              </a:rPr>
-              <a:t>tr</a:t>
+              <a:t>ptr</a:t>
             </a:r>
             <a:r>
               <a:rPr lang="en-US" sz="3200" baseline="-25000" dirty="0">
@@ -4173,11 +4148,6 @@
               </a:rPr>
               <a:t>3</a:t>
             </a:r>
-            <a:endParaRPr lang="en-US" sz="3200" baseline="-25000" dirty="0">
-              <a:solidFill>
-                <a:schemeClr val="tx1"/>
-              </a:solidFill>
-            </a:endParaRPr>
           </a:p>
         </p:txBody>
       </p:sp>
@@ -4237,11 +4207,6 @@
               </a:rPr>
               <a:t>3</a:t>
             </a:r>
-            <a:endParaRPr lang="en-US" sz="3600" b="1" baseline="-25000" dirty="0">
-              <a:solidFill>
-                <a:srgbClr val="FF0000"/>
-              </a:solidFill>
-            </a:endParaRPr>
           </a:p>
         </p:txBody>
       </p:sp>
@@ -4301,11 +4266,6 @@
               </a:rPr>
               <a:t>0</a:t>
             </a:r>
-            <a:endParaRPr lang="en-US" sz="3600" b="1" baseline="-25000" dirty="0">
-              <a:solidFill>
-                <a:srgbClr val="FF0000"/>
-              </a:solidFill>
-            </a:endParaRPr>
           </a:p>
         </p:txBody>
       </p:sp>
@@ -5049,6 +5009,1337 @@
     <p:extLst>
       <p:ext uri="{BB962C8B-B14F-4D97-AF65-F5344CB8AC3E}">
         <p14:creationId xmlns:p14="http://schemas.microsoft.com/office/powerpoint/2010/main" val="3304660966"/>
+      </p:ext>
+    </p:extLst>
+  </p:cSld>
+  <p:clrMapOvr>
+    <a:masterClrMapping/>
+  </p:clrMapOvr>
+</p:sld>
+</file>
+
+<file path=ppt/slides/slide4.xml><?xml version="1.0" encoding="utf-8"?>
+<p:sld xmlns:a="http://schemas.openxmlformats.org/drawingml/2006/main" xmlns:r="http://schemas.openxmlformats.org/officeDocument/2006/relationships" xmlns:p="http://schemas.openxmlformats.org/presentationml/2006/main">
+  <p:cSld>
+    <p:spTree>
+      <p:nvGrpSpPr>
+        <p:cNvPr id="1" name=""/>
+        <p:cNvGrpSpPr/>
+        <p:nvPr/>
+      </p:nvGrpSpPr>
+      <p:grpSpPr>
+        <a:xfrm>
+          <a:off x="0" y="0"/>
+          <a:ext cx="0" cy="0"/>
+          <a:chOff x="0" y="0"/>
+          <a:chExt cx="0" cy="0"/>
+        </a:xfrm>
+      </p:grpSpPr>
+      <p:sp>
+        <p:nvSpPr>
+          <p:cNvPr id="3" name="Rectangle 2"/>
+          <p:cNvSpPr/>
+          <p:nvPr/>
+        </p:nvSpPr>
+        <p:spPr>
+          <a:xfrm>
+            <a:off x="4847695" y="1297202"/>
+            <a:ext cx="1778000" cy="914400"/>
+          </a:xfrm>
+          <a:prstGeom prst="rect">
+            <a:avLst/>
+          </a:prstGeom>
+          <a:solidFill>
+            <a:srgbClr val="CCFFCC"/>
+          </a:solidFill>
+          <a:ln>
+            <a:solidFill>
+              <a:srgbClr val="CCFFCC"/>
+            </a:solidFill>
+          </a:ln>
+        </p:spPr>
+        <p:style>
+          <a:lnRef idx="1">
+            <a:schemeClr val="accent1"/>
+          </a:lnRef>
+          <a:fillRef idx="3">
+            <a:schemeClr val="accent1"/>
+          </a:fillRef>
+          <a:effectRef idx="2">
+            <a:schemeClr val="accent1"/>
+          </a:effectRef>
+          <a:fontRef idx="minor">
+            <a:schemeClr val="lt1"/>
+          </a:fontRef>
+        </p:style>
+        <p:txBody>
+          <a:bodyPr rtlCol="0" anchor="ctr"/>
+          <a:lstStyle/>
+          <a:p>
+            <a:pPr algn="ctr"/>
+            <a:endParaRPr lang="en-US"/>
+          </a:p>
+        </p:txBody>
+      </p:sp>
+      <p:cxnSp>
+        <p:nvCxnSpPr>
+          <p:cNvPr id="11" name="Straight Connector 10"/>
+          <p:cNvCxnSpPr/>
+          <p:nvPr/>
+        </p:nvCxnSpPr>
+        <p:spPr>
+          <a:xfrm>
+            <a:off x="5722584" y="1320486"/>
+            <a:ext cx="14111" cy="903111"/>
+          </a:xfrm>
+          <a:prstGeom prst="line">
+            <a:avLst/>
+          </a:prstGeom>
+          <a:ln>
+            <a:solidFill>
+              <a:srgbClr val="CCFFCC"/>
+            </a:solidFill>
+          </a:ln>
+        </p:spPr>
+        <p:style>
+          <a:lnRef idx="2">
+            <a:schemeClr val="accent1"/>
+          </a:lnRef>
+          <a:fillRef idx="0">
+            <a:schemeClr val="accent1"/>
+          </a:fillRef>
+          <a:effectRef idx="1">
+            <a:schemeClr val="accent1"/>
+          </a:effectRef>
+          <a:fontRef idx="minor">
+            <a:schemeClr val="tx1"/>
+          </a:fontRef>
+        </p:style>
+      </p:cxnSp>
+      <p:sp>
+        <p:nvSpPr>
+          <p:cNvPr id="15" name="TextBox 14"/>
+          <p:cNvSpPr txBox="1"/>
+          <p:nvPr/>
+        </p:nvSpPr>
+        <p:spPr>
+          <a:xfrm>
+            <a:off x="5928078" y="1308844"/>
+            <a:ext cx="624239" cy="707886"/>
+          </a:xfrm>
+          <a:prstGeom prst="rect">
+            <a:avLst/>
+          </a:prstGeom>
+          <a:solidFill>
+            <a:srgbClr val="CCFFCC"/>
+          </a:solidFill>
+          <a:ln>
+            <a:solidFill>
+              <a:srgbClr val="CCFFCC"/>
+            </a:solidFill>
+          </a:ln>
+        </p:spPr>
+        <p:txBody>
+          <a:bodyPr wrap="none" rtlCol="0">
+            <a:spAutoFit/>
+          </a:bodyPr>
+          <a:lstStyle/>
+          <a:p>
+            <a:r>
+              <a:rPr lang="en-US" sz="4000" dirty="0" smtClean="0"/>
+              <a:t>X</a:t>
+            </a:r>
+            <a:r>
+              <a:rPr lang="en-US" sz="4000" baseline="-25000" dirty="0" smtClean="0"/>
+              <a:t>8</a:t>
+            </a:r>
+            <a:endParaRPr lang="en-US" sz="4000" baseline="-25000" dirty="0"/>
+          </a:p>
+        </p:txBody>
+      </p:sp>
+      <p:sp>
+        <p:nvSpPr>
+          <p:cNvPr id="16" name="TextBox 15"/>
+          <p:cNvSpPr txBox="1"/>
+          <p:nvPr/>
+        </p:nvSpPr>
+        <p:spPr>
+          <a:xfrm>
+            <a:off x="4932889" y="1320486"/>
+            <a:ext cx="624239" cy="707886"/>
+          </a:xfrm>
+          <a:prstGeom prst="rect">
+            <a:avLst/>
+          </a:prstGeom>
+          <a:solidFill>
+            <a:srgbClr val="CCFFCC"/>
+          </a:solidFill>
+          <a:ln>
+            <a:solidFill>
+              <a:srgbClr val="CCFFCC"/>
+            </a:solidFill>
+          </a:ln>
+        </p:spPr>
+        <p:txBody>
+          <a:bodyPr wrap="none" rtlCol="0">
+            <a:spAutoFit/>
+          </a:bodyPr>
+          <a:lstStyle/>
+          <a:p>
+            <a:r>
+              <a:rPr lang="en-US" sz="4000" dirty="0" smtClean="0"/>
+              <a:t>X</a:t>
+            </a:r>
+            <a:r>
+              <a:rPr lang="en-US" sz="4000" baseline="-25000" dirty="0" smtClean="0"/>
+              <a:t>7</a:t>
+            </a:r>
+            <a:endParaRPr lang="en-US" sz="4000" baseline="-25000" dirty="0"/>
+          </a:p>
+        </p:txBody>
+      </p:sp>
+      <p:grpSp>
+        <p:nvGrpSpPr>
+          <p:cNvPr id="24" name="Group 23"/>
+          <p:cNvGrpSpPr/>
+          <p:nvPr/>
+        </p:nvGrpSpPr>
+        <p:grpSpPr>
+          <a:xfrm>
+            <a:off x="176917" y="1296849"/>
+            <a:ext cx="4670778" cy="926748"/>
+            <a:chOff x="176917" y="1296849"/>
+            <a:chExt cx="4670778" cy="926748"/>
+          </a:xfrm>
+        </p:grpSpPr>
+        <p:sp>
+          <p:nvSpPr>
+            <p:cNvPr id="2" name="Rectangle 1"/>
+            <p:cNvSpPr/>
+            <p:nvPr/>
+          </p:nvSpPr>
+          <p:spPr>
+            <a:xfrm>
+              <a:off x="176917" y="1297202"/>
+              <a:ext cx="4670778" cy="903111"/>
+            </a:xfrm>
+            <a:prstGeom prst="rect">
+              <a:avLst/>
+            </a:prstGeom>
+            <a:solidFill>
+              <a:srgbClr val="FF0000"/>
+            </a:solidFill>
+          </p:spPr>
+          <p:style>
+            <a:lnRef idx="1">
+              <a:schemeClr val="accent1"/>
+            </a:lnRef>
+            <a:fillRef idx="3">
+              <a:schemeClr val="accent1"/>
+            </a:fillRef>
+            <a:effectRef idx="2">
+              <a:schemeClr val="accent1"/>
+            </a:effectRef>
+            <a:fontRef idx="minor">
+              <a:schemeClr val="lt1"/>
+            </a:fontRef>
+          </p:style>
+          <p:txBody>
+            <a:bodyPr rtlCol="0" anchor="ctr"/>
+            <a:lstStyle/>
+            <a:p>
+              <a:pPr algn="ctr"/>
+              <a:endParaRPr lang="en-US"/>
+            </a:p>
+          </p:txBody>
+        </p:sp>
+        <p:cxnSp>
+          <p:nvCxnSpPr>
+            <p:cNvPr id="5" name="Straight Connector 4"/>
+            <p:cNvCxnSpPr/>
+            <p:nvPr/>
+          </p:nvCxnSpPr>
+          <p:spPr>
+            <a:xfrm>
+              <a:off x="868361" y="1297202"/>
+              <a:ext cx="14111" cy="903111"/>
+            </a:xfrm>
+            <a:prstGeom prst="line">
+              <a:avLst/>
+            </a:prstGeom>
+          </p:spPr>
+          <p:style>
+            <a:lnRef idx="2">
+              <a:schemeClr val="accent1"/>
+            </a:lnRef>
+            <a:fillRef idx="0">
+              <a:schemeClr val="accent1"/>
+            </a:fillRef>
+            <a:effectRef idx="1">
+              <a:schemeClr val="accent1"/>
+            </a:effectRef>
+            <a:fontRef idx="minor">
+              <a:schemeClr val="tx1"/>
+            </a:fontRef>
+          </p:style>
+        </p:cxnSp>
+        <p:cxnSp>
+          <p:nvCxnSpPr>
+            <p:cNvPr id="6" name="Straight Connector 5"/>
+            <p:cNvCxnSpPr/>
+            <p:nvPr/>
+          </p:nvCxnSpPr>
+          <p:spPr>
+            <a:xfrm>
+              <a:off x="1641650" y="1308844"/>
+              <a:ext cx="14111" cy="903111"/>
+            </a:xfrm>
+            <a:prstGeom prst="line">
+              <a:avLst/>
+            </a:prstGeom>
+          </p:spPr>
+          <p:style>
+            <a:lnRef idx="2">
+              <a:schemeClr val="accent1"/>
+            </a:lnRef>
+            <a:fillRef idx="0">
+              <a:schemeClr val="accent1"/>
+            </a:fillRef>
+            <a:effectRef idx="1">
+              <a:schemeClr val="accent1"/>
+            </a:effectRef>
+            <a:fontRef idx="minor">
+              <a:schemeClr val="tx1"/>
+            </a:fontRef>
+          </p:style>
+        </p:cxnSp>
+        <p:cxnSp>
+          <p:nvCxnSpPr>
+            <p:cNvPr id="7" name="Straight Connector 6"/>
+            <p:cNvCxnSpPr/>
+            <p:nvPr/>
+          </p:nvCxnSpPr>
+          <p:spPr>
+            <a:xfrm>
+              <a:off x="2403649" y="1308844"/>
+              <a:ext cx="14111" cy="903111"/>
+            </a:xfrm>
+            <a:prstGeom prst="line">
+              <a:avLst/>
+            </a:prstGeom>
+          </p:spPr>
+          <p:style>
+            <a:lnRef idx="2">
+              <a:schemeClr val="accent1"/>
+            </a:lnRef>
+            <a:fillRef idx="0">
+              <a:schemeClr val="accent1"/>
+            </a:fillRef>
+            <a:effectRef idx="1">
+              <a:schemeClr val="accent1"/>
+            </a:effectRef>
+            <a:fontRef idx="minor">
+              <a:schemeClr val="tx1"/>
+            </a:fontRef>
+          </p:style>
+        </p:cxnSp>
+        <p:cxnSp>
+          <p:nvCxnSpPr>
+            <p:cNvPr id="8" name="Straight Connector 7"/>
+            <p:cNvCxnSpPr/>
+            <p:nvPr/>
+          </p:nvCxnSpPr>
+          <p:spPr>
+            <a:xfrm>
+              <a:off x="3176938" y="1320486"/>
+              <a:ext cx="14111" cy="903111"/>
+            </a:xfrm>
+            <a:prstGeom prst="line">
+              <a:avLst/>
+            </a:prstGeom>
+          </p:spPr>
+          <p:style>
+            <a:lnRef idx="2">
+              <a:schemeClr val="accent1"/>
+            </a:lnRef>
+            <a:fillRef idx="0">
+              <a:schemeClr val="accent1"/>
+            </a:fillRef>
+            <a:effectRef idx="1">
+              <a:schemeClr val="accent1"/>
+            </a:effectRef>
+            <a:fontRef idx="minor">
+              <a:schemeClr val="tx1"/>
+            </a:fontRef>
+          </p:style>
+        </p:cxnSp>
+        <p:cxnSp>
+          <p:nvCxnSpPr>
+            <p:cNvPr id="9" name="Straight Connector 8"/>
+            <p:cNvCxnSpPr/>
+            <p:nvPr/>
+          </p:nvCxnSpPr>
+          <p:spPr>
+            <a:xfrm>
+              <a:off x="4046184" y="1296849"/>
+              <a:ext cx="14111" cy="903111"/>
+            </a:xfrm>
+            <a:prstGeom prst="line">
+              <a:avLst/>
+            </a:prstGeom>
+          </p:spPr>
+          <p:style>
+            <a:lnRef idx="2">
+              <a:schemeClr val="accent1"/>
+            </a:lnRef>
+            <a:fillRef idx="0">
+              <a:schemeClr val="accent1"/>
+            </a:fillRef>
+            <a:effectRef idx="1">
+              <a:schemeClr val="accent1"/>
+            </a:effectRef>
+            <a:fontRef idx="minor">
+              <a:schemeClr val="tx1"/>
+            </a:fontRef>
+          </p:style>
+        </p:cxnSp>
+        <p:sp>
+          <p:nvSpPr>
+            <p:cNvPr id="13" name="TextBox 12"/>
+            <p:cNvSpPr txBox="1"/>
+            <p:nvPr/>
+          </p:nvSpPr>
+          <p:spPr>
+            <a:xfrm>
+              <a:off x="208490" y="1359997"/>
+              <a:ext cx="624239" cy="707886"/>
+            </a:xfrm>
+            <a:prstGeom prst="rect">
+              <a:avLst/>
+            </a:prstGeom>
+            <a:noFill/>
+          </p:spPr>
+          <p:txBody>
+            <a:bodyPr wrap="none" rtlCol="0">
+              <a:spAutoFit/>
+            </a:bodyPr>
+            <a:lstStyle/>
+            <a:p>
+              <a:r>
+                <a:rPr lang="en-US" sz="4000" dirty="0" smtClean="0"/>
+                <a:t>X</a:t>
+              </a:r>
+              <a:r>
+                <a:rPr lang="en-US" sz="4000" baseline="-25000" dirty="0" smtClean="0"/>
+                <a:t>1</a:t>
+              </a:r>
+              <a:endParaRPr lang="en-US" sz="4000" baseline="-25000" dirty="0"/>
+            </a:p>
+          </p:txBody>
+        </p:sp>
+        <p:sp>
+          <p:nvSpPr>
+            <p:cNvPr id="17" name="TextBox 16"/>
+            <p:cNvSpPr txBox="1"/>
+            <p:nvPr/>
+          </p:nvSpPr>
+          <p:spPr>
+            <a:xfrm>
+              <a:off x="4060295" y="1308844"/>
+              <a:ext cx="624239" cy="707886"/>
+            </a:xfrm>
+            <a:prstGeom prst="rect">
+              <a:avLst/>
+            </a:prstGeom>
+            <a:noFill/>
+          </p:spPr>
+          <p:txBody>
+            <a:bodyPr wrap="none" rtlCol="0">
+              <a:spAutoFit/>
+            </a:bodyPr>
+            <a:lstStyle/>
+            <a:p>
+              <a:r>
+                <a:rPr lang="en-US" sz="4000" dirty="0" smtClean="0"/>
+                <a:t>X</a:t>
+              </a:r>
+              <a:r>
+                <a:rPr lang="en-US" sz="4000" baseline="-25000" dirty="0" smtClean="0"/>
+                <a:t>6</a:t>
+              </a:r>
+              <a:endParaRPr lang="en-US" sz="4000" baseline="-25000" dirty="0"/>
+            </a:p>
+          </p:txBody>
+        </p:sp>
+        <p:sp>
+          <p:nvSpPr>
+            <p:cNvPr id="18" name="TextBox 17"/>
+            <p:cNvSpPr txBox="1"/>
+            <p:nvPr/>
+          </p:nvSpPr>
+          <p:spPr>
+            <a:xfrm>
+              <a:off x="3223506" y="1308844"/>
+              <a:ext cx="624239" cy="707886"/>
+            </a:xfrm>
+            <a:prstGeom prst="rect">
+              <a:avLst/>
+            </a:prstGeom>
+            <a:noFill/>
+          </p:spPr>
+          <p:txBody>
+            <a:bodyPr wrap="none" rtlCol="0">
+              <a:spAutoFit/>
+            </a:bodyPr>
+            <a:lstStyle/>
+            <a:p>
+              <a:r>
+                <a:rPr lang="en-US" sz="4000" dirty="0" smtClean="0"/>
+                <a:t>X</a:t>
+              </a:r>
+              <a:r>
+                <a:rPr lang="en-US" sz="4000" baseline="-25000" dirty="0" smtClean="0"/>
+                <a:t>5</a:t>
+              </a:r>
+              <a:endParaRPr lang="en-US" sz="4000" baseline="-25000" dirty="0"/>
+            </a:p>
+          </p:txBody>
+        </p:sp>
+        <p:sp>
+          <p:nvSpPr>
+            <p:cNvPr id="19" name="TextBox 18"/>
+            <p:cNvSpPr txBox="1"/>
+            <p:nvPr/>
+          </p:nvSpPr>
+          <p:spPr>
+            <a:xfrm>
+              <a:off x="2403649" y="1297202"/>
+              <a:ext cx="633507" cy="707886"/>
+            </a:xfrm>
+            <a:prstGeom prst="rect">
+              <a:avLst/>
+            </a:prstGeom>
+            <a:noFill/>
+          </p:spPr>
+          <p:txBody>
+            <a:bodyPr wrap="none" rtlCol="0">
+              <a:spAutoFit/>
+            </a:bodyPr>
+            <a:lstStyle/>
+            <a:p>
+              <a:r>
+                <a:rPr lang="en-US" sz="4000" dirty="0" smtClean="0"/>
+                <a:t>X</a:t>
+              </a:r>
+              <a:r>
+                <a:rPr lang="en-US" sz="4000" baseline="-25000" dirty="0" smtClean="0"/>
+                <a:t>4</a:t>
+              </a:r>
+              <a:endParaRPr lang="en-US" sz="4000" baseline="-25000" dirty="0"/>
+            </a:p>
+          </p:txBody>
+        </p:sp>
+        <p:sp>
+          <p:nvSpPr>
+            <p:cNvPr id="20" name="TextBox 19"/>
+            <p:cNvSpPr txBox="1"/>
+            <p:nvPr/>
+          </p:nvSpPr>
+          <p:spPr>
+            <a:xfrm>
+              <a:off x="1655761" y="1308844"/>
+              <a:ext cx="624239" cy="707886"/>
+            </a:xfrm>
+            <a:prstGeom prst="rect">
+              <a:avLst/>
+            </a:prstGeom>
+            <a:noFill/>
+          </p:spPr>
+          <p:txBody>
+            <a:bodyPr wrap="none" rtlCol="0">
+              <a:spAutoFit/>
+            </a:bodyPr>
+            <a:lstStyle/>
+            <a:p>
+              <a:r>
+                <a:rPr lang="en-US" sz="4000" dirty="0" smtClean="0"/>
+                <a:t>X</a:t>
+              </a:r>
+              <a:r>
+                <a:rPr lang="en-US" sz="4000" baseline="-25000" dirty="0"/>
+                <a:t>3</a:t>
+              </a:r>
+            </a:p>
+          </p:txBody>
+        </p:sp>
+        <p:sp>
+          <p:nvSpPr>
+            <p:cNvPr id="21" name="TextBox 20"/>
+            <p:cNvSpPr txBox="1"/>
+            <p:nvPr/>
+          </p:nvSpPr>
+          <p:spPr>
+            <a:xfrm>
+              <a:off x="931597" y="1365641"/>
+              <a:ext cx="624239" cy="707886"/>
+            </a:xfrm>
+            <a:prstGeom prst="rect">
+              <a:avLst/>
+            </a:prstGeom>
+            <a:noFill/>
+          </p:spPr>
+          <p:txBody>
+            <a:bodyPr wrap="none" rtlCol="0">
+              <a:spAutoFit/>
+            </a:bodyPr>
+            <a:lstStyle/>
+            <a:p>
+              <a:r>
+                <a:rPr lang="en-US" sz="4000" dirty="0" smtClean="0"/>
+                <a:t>X</a:t>
+              </a:r>
+              <a:r>
+                <a:rPr lang="en-US" sz="4000" baseline="-25000" dirty="0"/>
+                <a:t>2</a:t>
+              </a:r>
+            </a:p>
+          </p:txBody>
+        </p:sp>
+      </p:grpSp>
+      <p:sp>
+        <p:nvSpPr>
+          <p:cNvPr id="22" name="Oval 21"/>
+          <p:cNvSpPr/>
+          <p:nvPr/>
+        </p:nvSpPr>
+        <p:spPr>
+          <a:xfrm>
+            <a:off x="6843889" y="508000"/>
+            <a:ext cx="2173111" cy="2074334"/>
+          </a:xfrm>
+          <a:prstGeom prst="ellipse">
+            <a:avLst/>
+          </a:prstGeom>
+        </p:spPr>
+        <p:style>
+          <a:lnRef idx="1">
+            <a:schemeClr val="accent1"/>
+          </a:lnRef>
+          <a:fillRef idx="3">
+            <a:schemeClr val="accent1"/>
+          </a:fillRef>
+          <a:effectRef idx="2">
+            <a:schemeClr val="accent1"/>
+          </a:effectRef>
+          <a:fontRef idx="minor">
+            <a:schemeClr val="lt1"/>
+          </a:fontRef>
+        </p:style>
+        <p:txBody>
+          <a:bodyPr rtlCol="0" anchor="ctr"/>
+          <a:lstStyle/>
+          <a:p>
+            <a:pPr algn="ctr"/>
+            <a:r>
+              <a:rPr lang="en-US" sz="3200" dirty="0" smtClean="0"/>
+              <a:t>Trusted Agent</a:t>
+            </a:r>
+            <a:endParaRPr lang="en-US" sz="3200" dirty="0"/>
+          </a:p>
+        </p:txBody>
+      </p:sp>
+      <p:sp>
+        <p:nvSpPr>
+          <p:cNvPr id="23" name="TextBox 22"/>
+          <p:cNvSpPr txBox="1"/>
+          <p:nvPr/>
+        </p:nvSpPr>
+        <p:spPr>
+          <a:xfrm>
+            <a:off x="1125916" y="508000"/>
+            <a:ext cx="4195179" cy="584776"/>
+          </a:xfrm>
+          <a:prstGeom prst="rect">
+            <a:avLst/>
+          </a:prstGeom>
+          <a:noFill/>
+        </p:spPr>
+        <p:txBody>
+          <a:bodyPr wrap="none" rtlCol="0">
+            <a:spAutoFit/>
+          </a:bodyPr>
+          <a:lstStyle/>
+          <a:p>
+            <a:r>
+              <a:rPr lang="en-US" sz="3200" dirty="0" smtClean="0"/>
+              <a:t>The Current Block Chain</a:t>
+            </a:r>
+            <a:endParaRPr lang="en-US" sz="3200" dirty="0"/>
+          </a:p>
+        </p:txBody>
+      </p:sp>
+      <p:grpSp>
+        <p:nvGrpSpPr>
+          <p:cNvPr id="25" name="Group 24"/>
+          <p:cNvGrpSpPr/>
+          <p:nvPr/>
+        </p:nvGrpSpPr>
+        <p:grpSpPr>
+          <a:xfrm>
+            <a:off x="176917" y="3721138"/>
+            <a:ext cx="4670778" cy="926748"/>
+            <a:chOff x="176917" y="1296849"/>
+            <a:chExt cx="4670778" cy="926748"/>
+          </a:xfrm>
+        </p:grpSpPr>
+        <p:sp>
+          <p:nvSpPr>
+            <p:cNvPr id="26" name="Rectangle 25"/>
+            <p:cNvSpPr/>
+            <p:nvPr/>
+          </p:nvSpPr>
+          <p:spPr>
+            <a:xfrm>
+              <a:off x="176917" y="1297202"/>
+              <a:ext cx="4670778" cy="903111"/>
+            </a:xfrm>
+            <a:prstGeom prst="rect">
+              <a:avLst/>
+            </a:prstGeom>
+            <a:solidFill>
+              <a:srgbClr val="FF0000"/>
+            </a:solidFill>
+          </p:spPr>
+          <p:style>
+            <a:lnRef idx="1">
+              <a:schemeClr val="accent1"/>
+            </a:lnRef>
+            <a:fillRef idx="3">
+              <a:schemeClr val="accent1"/>
+            </a:fillRef>
+            <a:effectRef idx="2">
+              <a:schemeClr val="accent1"/>
+            </a:effectRef>
+            <a:fontRef idx="minor">
+              <a:schemeClr val="lt1"/>
+            </a:fontRef>
+          </p:style>
+          <p:txBody>
+            <a:bodyPr rtlCol="0" anchor="ctr"/>
+            <a:lstStyle/>
+            <a:p>
+              <a:pPr algn="ctr"/>
+              <a:endParaRPr lang="en-US"/>
+            </a:p>
+          </p:txBody>
+        </p:sp>
+        <p:cxnSp>
+          <p:nvCxnSpPr>
+            <p:cNvPr id="27" name="Straight Connector 26"/>
+            <p:cNvCxnSpPr/>
+            <p:nvPr/>
+          </p:nvCxnSpPr>
+          <p:spPr>
+            <a:xfrm>
+              <a:off x="868361" y="1297202"/>
+              <a:ext cx="14111" cy="903111"/>
+            </a:xfrm>
+            <a:prstGeom prst="line">
+              <a:avLst/>
+            </a:prstGeom>
+          </p:spPr>
+          <p:style>
+            <a:lnRef idx="2">
+              <a:schemeClr val="accent1"/>
+            </a:lnRef>
+            <a:fillRef idx="0">
+              <a:schemeClr val="accent1"/>
+            </a:fillRef>
+            <a:effectRef idx="1">
+              <a:schemeClr val="accent1"/>
+            </a:effectRef>
+            <a:fontRef idx="minor">
+              <a:schemeClr val="tx1"/>
+            </a:fontRef>
+          </p:style>
+        </p:cxnSp>
+        <p:cxnSp>
+          <p:nvCxnSpPr>
+            <p:cNvPr id="28" name="Straight Connector 27"/>
+            <p:cNvCxnSpPr/>
+            <p:nvPr/>
+          </p:nvCxnSpPr>
+          <p:spPr>
+            <a:xfrm>
+              <a:off x="1641650" y="1308844"/>
+              <a:ext cx="14111" cy="903111"/>
+            </a:xfrm>
+            <a:prstGeom prst="line">
+              <a:avLst/>
+            </a:prstGeom>
+          </p:spPr>
+          <p:style>
+            <a:lnRef idx="2">
+              <a:schemeClr val="accent1"/>
+            </a:lnRef>
+            <a:fillRef idx="0">
+              <a:schemeClr val="accent1"/>
+            </a:fillRef>
+            <a:effectRef idx="1">
+              <a:schemeClr val="accent1"/>
+            </a:effectRef>
+            <a:fontRef idx="minor">
+              <a:schemeClr val="tx1"/>
+            </a:fontRef>
+          </p:style>
+        </p:cxnSp>
+        <p:cxnSp>
+          <p:nvCxnSpPr>
+            <p:cNvPr id="29" name="Straight Connector 28"/>
+            <p:cNvCxnSpPr/>
+            <p:nvPr/>
+          </p:nvCxnSpPr>
+          <p:spPr>
+            <a:xfrm>
+              <a:off x="2403649" y="1308844"/>
+              <a:ext cx="14111" cy="903111"/>
+            </a:xfrm>
+            <a:prstGeom prst="line">
+              <a:avLst/>
+            </a:prstGeom>
+          </p:spPr>
+          <p:style>
+            <a:lnRef idx="2">
+              <a:schemeClr val="accent1"/>
+            </a:lnRef>
+            <a:fillRef idx="0">
+              <a:schemeClr val="accent1"/>
+            </a:fillRef>
+            <a:effectRef idx="1">
+              <a:schemeClr val="accent1"/>
+            </a:effectRef>
+            <a:fontRef idx="minor">
+              <a:schemeClr val="tx1"/>
+            </a:fontRef>
+          </p:style>
+        </p:cxnSp>
+        <p:cxnSp>
+          <p:nvCxnSpPr>
+            <p:cNvPr id="30" name="Straight Connector 29"/>
+            <p:cNvCxnSpPr/>
+            <p:nvPr/>
+          </p:nvCxnSpPr>
+          <p:spPr>
+            <a:xfrm>
+              <a:off x="3176938" y="1320486"/>
+              <a:ext cx="14111" cy="903111"/>
+            </a:xfrm>
+            <a:prstGeom prst="line">
+              <a:avLst/>
+            </a:prstGeom>
+          </p:spPr>
+          <p:style>
+            <a:lnRef idx="2">
+              <a:schemeClr val="accent1"/>
+            </a:lnRef>
+            <a:fillRef idx="0">
+              <a:schemeClr val="accent1"/>
+            </a:fillRef>
+            <a:effectRef idx="1">
+              <a:schemeClr val="accent1"/>
+            </a:effectRef>
+            <a:fontRef idx="minor">
+              <a:schemeClr val="tx1"/>
+            </a:fontRef>
+          </p:style>
+        </p:cxnSp>
+        <p:cxnSp>
+          <p:nvCxnSpPr>
+            <p:cNvPr id="31" name="Straight Connector 30"/>
+            <p:cNvCxnSpPr/>
+            <p:nvPr/>
+          </p:nvCxnSpPr>
+          <p:spPr>
+            <a:xfrm>
+              <a:off x="4046184" y="1296849"/>
+              <a:ext cx="14111" cy="903111"/>
+            </a:xfrm>
+            <a:prstGeom prst="line">
+              <a:avLst/>
+            </a:prstGeom>
+          </p:spPr>
+          <p:style>
+            <a:lnRef idx="2">
+              <a:schemeClr val="accent1"/>
+            </a:lnRef>
+            <a:fillRef idx="0">
+              <a:schemeClr val="accent1"/>
+            </a:fillRef>
+            <a:effectRef idx="1">
+              <a:schemeClr val="accent1"/>
+            </a:effectRef>
+            <a:fontRef idx="minor">
+              <a:schemeClr val="tx1"/>
+            </a:fontRef>
+          </p:style>
+        </p:cxnSp>
+        <p:sp>
+          <p:nvSpPr>
+            <p:cNvPr id="32" name="TextBox 31"/>
+            <p:cNvSpPr txBox="1"/>
+            <p:nvPr/>
+          </p:nvSpPr>
+          <p:spPr>
+            <a:xfrm>
+              <a:off x="208490" y="1359997"/>
+              <a:ext cx="624239" cy="707886"/>
+            </a:xfrm>
+            <a:prstGeom prst="rect">
+              <a:avLst/>
+            </a:prstGeom>
+            <a:noFill/>
+          </p:spPr>
+          <p:txBody>
+            <a:bodyPr wrap="none" rtlCol="0">
+              <a:spAutoFit/>
+            </a:bodyPr>
+            <a:lstStyle/>
+            <a:p>
+              <a:r>
+                <a:rPr lang="en-US" sz="4000" dirty="0" smtClean="0"/>
+                <a:t>X</a:t>
+              </a:r>
+              <a:r>
+                <a:rPr lang="en-US" sz="4000" baseline="-25000" dirty="0" smtClean="0"/>
+                <a:t>1</a:t>
+              </a:r>
+              <a:endParaRPr lang="en-US" sz="4000" baseline="-25000" dirty="0"/>
+            </a:p>
+          </p:txBody>
+        </p:sp>
+        <p:sp>
+          <p:nvSpPr>
+            <p:cNvPr id="33" name="TextBox 32"/>
+            <p:cNvSpPr txBox="1"/>
+            <p:nvPr/>
+          </p:nvSpPr>
+          <p:spPr>
+            <a:xfrm>
+              <a:off x="4060295" y="1308844"/>
+              <a:ext cx="624239" cy="707886"/>
+            </a:xfrm>
+            <a:prstGeom prst="rect">
+              <a:avLst/>
+            </a:prstGeom>
+            <a:noFill/>
+          </p:spPr>
+          <p:txBody>
+            <a:bodyPr wrap="none" rtlCol="0">
+              <a:spAutoFit/>
+            </a:bodyPr>
+            <a:lstStyle/>
+            <a:p>
+              <a:r>
+                <a:rPr lang="en-US" sz="4000" dirty="0" smtClean="0"/>
+                <a:t>X</a:t>
+              </a:r>
+              <a:r>
+                <a:rPr lang="en-US" sz="4000" baseline="-25000" dirty="0" smtClean="0"/>
+                <a:t>6</a:t>
+              </a:r>
+              <a:endParaRPr lang="en-US" sz="4000" baseline="-25000" dirty="0"/>
+            </a:p>
+          </p:txBody>
+        </p:sp>
+        <p:sp>
+          <p:nvSpPr>
+            <p:cNvPr id="34" name="TextBox 33"/>
+            <p:cNvSpPr txBox="1"/>
+            <p:nvPr/>
+          </p:nvSpPr>
+          <p:spPr>
+            <a:xfrm>
+              <a:off x="3223506" y="1308844"/>
+              <a:ext cx="624239" cy="707886"/>
+            </a:xfrm>
+            <a:prstGeom prst="rect">
+              <a:avLst/>
+            </a:prstGeom>
+            <a:noFill/>
+          </p:spPr>
+          <p:txBody>
+            <a:bodyPr wrap="none" rtlCol="0">
+              <a:spAutoFit/>
+            </a:bodyPr>
+            <a:lstStyle/>
+            <a:p>
+              <a:r>
+                <a:rPr lang="en-US" sz="4000" dirty="0" smtClean="0"/>
+                <a:t>X</a:t>
+              </a:r>
+              <a:r>
+                <a:rPr lang="en-US" sz="4000" baseline="-25000" dirty="0" smtClean="0"/>
+                <a:t>5</a:t>
+              </a:r>
+              <a:endParaRPr lang="en-US" sz="4000" baseline="-25000" dirty="0"/>
+            </a:p>
+          </p:txBody>
+        </p:sp>
+        <p:sp>
+          <p:nvSpPr>
+            <p:cNvPr id="35" name="TextBox 34"/>
+            <p:cNvSpPr txBox="1"/>
+            <p:nvPr/>
+          </p:nvSpPr>
+          <p:spPr>
+            <a:xfrm>
+              <a:off x="2403649" y="1297202"/>
+              <a:ext cx="633507" cy="707886"/>
+            </a:xfrm>
+            <a:prstGeom prst="rect">
+              <a:avLst/>
+            </a:prstGeom>
+            <a:noFill/>
+          </p:spPr>
+          <p:txBody>
+            <a:bodyPr wrap="none" rtlCol="0">
+              <a:spAutoFit/>
+            </a:bodyPr>
+            <a:lstStyle/>
+            <a:p>
+              <a:r>
+                <a:rPr lang="en-US" sz="4000" dirty="0" smtClean="0"/>
+                <a:t>X</a:t>
+              </a:r>
+              <a:r>
+                <a:rPr lang="en-US" sz="4000" baseline="-25000" dirty="0" smtClean="0"/>
+                <a:t>4</a:t>
+              </a:r>
+              <a:endParaRPr lang="en-US" sz="4000" baseline="-25000" dirty="0"/>
+            </a:p>
+          </p:txBody>
+        </p:sp>
+        <p:sp>
+          <p:nvSpPr>
+            <p:cNvPr id="36" name="TextBox 35"/>
+            <p:cNvSpPr txBox="1"/>
+            <p:nvPr/>
+          </p:nvSpPr>
+          <p:spPr>
+            <a:xfrm>
+              <a:off x="1655761" y="1308844"/>
+              <a:ext cx="624239" cy="707886"/>
+            </a:xfrm>
+            <a:prstGeom prst="rect">
+              <a:avLst/>
+            </a:prstGeom>
+            <a:noFill/>
+          </p:spPr>
+          <p:txBody>
+            <a:bodyPr wrap="none" rtlCol="0">
+              <a:spAutoFit/>
+            </a:bodyPr>
+            <a:lstStyle/>
+            <a:p>
+              <a:r>
+                <a:rPr lang="en-US" sz="4000" dirty="0" smtClean="0"/>
+                <a:t>X</a:t>
+              </a:r>
+              <a:r>
+                <a:rPr lang="en-US" sz="4000" baseline="-25000" dirty="0"/>
+                <a:t>3</a:t>
+              </a:r>
+            </a:p>
+          </p:txBody>
+        </p:sp>
+        <p:sp>
+          <p:nvSpPr>
+            <p:cNvPr id="37" name="TextBox 36"/>
+            <p:cNvSpPr txBox="1"/>
+            <p:nvPr/>
+          </p:nvSpPr>
+          <p:spPr>
+            <a:xfrm>
+              <a:off x="931597" y="1365641"/>
+              <a:ext cx="624239" cy="707886"/>
+            </a:xfrm>
+            <a:prstGeom prst="rect">
+              <a:avLst/>
+            </a:prstGeom>
+            <a:noFill/>
+          </p:spPr>
+          <p:txBody>
+            <a:bodyPr wrap="none" rtlCol="0">
+              <a:spAutoFit/>
+            </a:bodyPr>
+            <a:lstStyle/>
+            <a:p>
+              <a:r>
+                <a:rPr lang="en-US" sz="4000" dirty="0" smtClean="0"/>
+                <a:t>X</a:t>
+              </a:r>
+              <a:r>
+                <a:rPr lang="en-US" sz="4000" baseline="-25000" dirty="0"/>
+                <a:t>2</a:t>
+              </a:r>
+            </a:p>
+          </p:txBody>
+        </p:sp>
+      </p:grpSp>
+      <p:sp>
+        <p:nvSpPr>
+          <p:cNvPr id="38" name="TextBox 37"/>
+          <p:cNvSpPr txBox="1"/>
+          <p:nvPr/>
+        </p:nvSpPr>
+        <p:spPr>
+          <a:xfrm>
+            <a:off x="0" y="4647886"/>
+            <a:ext cx="5323092" cy="584776"/>
+          </a:xfrm>
+          <a:prstGeom prst="rect">
+            <a:avLst/>
+          </a:prstGeom>
+          <a:noFill/>
+        </p:spPr>
+        <p:txBody>
+          <a:bodyPr wrap="none" rtlCol="0">
+            <a:spAutoFit/>
+          </a:bodyPr>
+          <a:lstStyle/>
+          <a:p>
+            <a:r>
+              <a:rPr lang="en-US" sz="3200" dirty="0" smtClean="0"/>
+              <a:t>Old Version of the  Block Chain</a:t>
+            </a:r>
+            <a:endParaRPr lang="en-US" sz="3200" dirty="0"/>
+          </a:p>
+        </p:txBody>
+      </p:sp>
+      <p:cxnSp>
+        <p:nvCxnSpPr>
+          <p:cNvPr id="40" name="Straight Connector 39"/>
+          <p:cNvCxnSpPr/>
+          <p:nvPr/>
+        </p:nvCxnSpPr>
+        <p:spPr>
+          <a:xfrm>
+            <a:off x="176917" y="2223597"/>
+            <a:ext cx="0" cy="1521178"/>
+          </a:xfrm>
+          <a:prstGeom prst="line">
+            <a:avLst/>
+          </a:prstGeom>
+          <a:ln>
+            <a:prstDash val="dash"/>
+          </a:ln>
+        </p:spPr>
+        <p:style>
+          <a:lnRef idx="2">
+            <a:schemeClr val="accent1"/>
+          </a:lnRef>
+          <a:fillRef idx="0">
+            <a:schemeClr val="accent1"/>
+          </a:fillRef>
+          <a:effectRef idx="1">
+            <a:schemeClr val="accent1"/>
+          </a:effectRef>
+          <a:fontRef idx="minor">
+            <a:schemeClr val="tx1"/>
+          </a:fontRef>
+        </p:style>
+      </p:cxnSp>
+      <p:cxnSp>
+        <p:nvCxnSpPr>
+          <p:cNvPr id="43" name="Straight Connector 42"/>
+          <p:cNvCxnSpPr/>
+          <p:nvPr/>
+        </p:nvCxnSpPr>
+        <p:spPr>
+          <a:xfrm>
+            <a:off x="4847695" y="2199960"/>
+            <a:ext cx="0" cy="1521178"/>
+          </a:xfrm>
+          <a:prstGeom prst="line">
+            <a:avLst/>
+          </a:prstGeom>
+          <a:ln>
+            <a:prstDash val="dash"/>
+          </a:ln>
+        </p:spPr>
+        <p:style>
+          <a:lnRef idx="2">
+            <a:schemeClr val="accent1"/>
+          </a:lnRef>
+          <a:fillRef idx="0">
+            <a:schemeClr val="accent1"/>
+          </a:fillRef>
+          <a:effectRef idx="1">
+            <a:schemeClr val="accent1"/>
+          </a:effectRef>
+          <a:fontRef idx="minor">
+            <a:schemeClr val="tx1"/>
+          </a:fontRef>
+        </p:style>
+      </p:cxnSp>
+      <p:sp>
+        <p:nvSpPr>
+          <p:cNvPr id="44" name="TextBox 43"/>
+          <p:cNvSpPr txBox="1"/>
+          <p:nvPr/>
+        </p:nvSpPr>
+        <p:spPr>
+          <a:xfrm>
+            <a:off x="1946331" y="2627175"/>
+            <a:ext cx="1146468" cy="584776"/>
+          </a:xfrm>
+          <a:prstGeom prst="rect">
+            <a:avLst/>
+          </a:prstGeom>
+          <a:noFill/>
+        </p:spPr>
+        <p:txBody>
+          <a:bodyPr wrap="none" rtlCol="0">
+            <a:spAutoFit/>
+          </a:bodyPr>
+          <a:lstStyle/>
+          <a:p>
+            <a:r>
+              <a:rPr lang="en-US" sz="3200" dirty="0" smtClean="0"/>
+              <a:t>Prefix</a:t>
+            </a:r>
+            <a:endParaRPr lang="en-US" sz="3200" dirty="0"/>
+          </a:p>
+        </p:txBody>
+      </p:sp>
+      <p:cxnSp>
+        <p:nvCxnSpPr>
+          <p:cNvPr id="46" name="Straight Arrow Connector 45"/>
+          <p:cNvCxnSpPr>
+            <a:stCxn id="2" idx="2"/>
+          </p:cNvCxnSpPr>
+          <p:nvPr/>
+        </p:nvCxnSpPr>
+        <p:spPr>
+          <a:xfrm>
+            <a:off x="2512306" y="2200313"/>
+            <a:ext cx="0" cy="537243"/>
+          </a:xfrm>
+          <a:prstGeom prst="straightConnector1">
+            <a:avLst/>
+          </a:prstGeom>
+          <a:ln>
+            <a:tailEnd type="arrow"/>
+          </a:ln>
+        </p:spPr>
+        <p:style>
+          <a:lnRef idx="2">
+            <a:schemeClr val="accent1"/>
+          </a:lnRef>
+          <a:fillRef idx="0">
+            <a:schemeClr val="accent1"/>
+          </a:fillRef>
+          <a:effectRef idx="1">
+            <a:schemeClr val="accent1"/>
+          </a:effectRef>
+          <a:fontRef idx="minor">
+            <a:schemeClr val="tx1"/>
+          </a:fontRef>
+        </p:style>
+      </p:cxnSp>
+      <p:cxnSp>
+        <p:nvCxnSpPr>
+          <p:cNvPr id="48" name="Straight Arrow Connector 47"/>
+          <p:cNvCxnSpPr>
+            <a:stCxn id="44" idx="2"/>
+          </p:cNvCxnSpPr>
+          <p:nvPr/>
+        </p:nvCxnSpPr>
+        <p:spPr>
+          <a:xfrm>
+            <a:off x="2519565" y="3211951"/>
+            <a:ext cx="0" cy="509540"/>
+          </a:xfrm>
+          <a:prstGeom prst="straightConnector1">
+            <a:avLst/>
+          </a:prstGeom>
+          <a:ln>
+            <a:tailEnd type="arrow"/>
+          </a:ln>
+        </p:spPr>
+        <p:style>
+          <a:lnRef idx="2">
+            <a:schemeClr val="accent1"/>
+          </a:lnRef>
+          <a:fillRef idx="0">
+            <a:schemeClr val="accent1"/>
+          </a:fillRef>
+          <a:effectRef idx="1">
+            <a:schemeClr val="accent1"/>
+          </a:effectRef>
+          <a:fontRef idx="minor">
+            <a:schemeClr val="tx1"/>
+          </a:fontRef>
+        </p:style>
+      </p:cxnSp>
+      <p:sp>
+        <p:nvSpPr>
+          <p:cNvPr id="52" name="TextBox 51"/>
+          <p:cNvSpPr txBox="1"/>
+          <p:nvPr/>
+        </p:nvSpPr>
+        <p:spPr>
+          <a:xfrm>
+            <a:off x="0" y="5511491"/>
+            <a:ext cx="9144000" cy="1323439"/>
+          </a:xfrm>
+          <a:prstGeom prst="rect">
+            <a:avLst/>
+          </a:prstGeom>
+          <a:solidFill>
+            <a:srgbClr val="FFFF00"/>
+          </a:solidFill>
+          <a:ln>
+            <a:solidFill>
+              <a:srgbClr val="FFFF00"/>
+            </a:solidFill>
+          </a:ln>
+        </p:spPr>
+        <p:txBody>
+          <a:bodyPr wrap="square" rtlCol="0">
+            <a:spAutoFit/>
+          </a:bodyPr>
+          <a:lstStyle/>
+          <a:p>
+            <a:pPr algn="ctr"/>
+            <a:r>
+              <a:rPr lang="en-US" sz="4000" b="1" dirty="0" smtClean="0"/>
+              <a:t>The </a:t>
+            </a:r>
+            <a:r>
+              <a:rPr lang="en-US" sz="4000" b="1" dirty="0"/>
+              <a:t>o</a:t>
+            </a:r>
+            <a:r>
+              <a:rPr lang="en-US" sz="4000" b="1" dirty="0" smtClean="0"/>
+              <a:t>ld </a:t>
+            </a:r>
+            <a:r>
+              <a:rPr lang="en-US" sz="4000" b="1" dirty="0"/>
+              <a:t>v</a:t>
+            </a:r>
+            <a:r>
+              <a:rPr lang="en-US" sz="4000" b="1" dirty="0" smtClean="0"/>
+              <a:t>ersion must be a prefix of the current version</a:t>
+            </a:r>
+            <a:endParaRPr lang="en-US" sz="4000" b="1" dirty="0"/>
+          </a:p>
+        </p:txBody>
+      </p:sp>
+    </p:spTree>
+    <p:extLst>
+      <p:ext uri="{BB962C8B-B14F-4D97-AF65-F5344CB8AC3E}">
+        <p14:creationId xmlns:p14="http://schemas.microsoft.com/office/powerpoint/2010/main" val="1589512374"/>
       </p:ext>
     </p:extLst>
   </p:cSld>

</xml_diff>